<commit_message>
Adicionado arquivos de aula e trabalho do prof umberto. Adicionado pdf do Trabalho do prof renes
</commit_message>
<xml_diff>
--- a/Renes/Trabalho 2/SGR Trabalho 2 - Sistema Fotovoltaico.pptx
+++ b/Renes/Trabalho 2/SGR Trabalho 2 - Sistema Fotovoltaico.pptx
@@ -309,7 +309,7 @@
               <a:pPr>
                 <a:defRPr/>
               </a:pPr>
-              <a:t>30/09/2015</a:t>
+              <a:t>03/10/2015</a:t>
             </a:fld>
             <a:endParaRPr lang="pt-BR" dirty="0"/>
           </a:p>
@@ -563,7 +563,7 @@
               <a:pPr>
                 <a:defRPr/>
               </a:pPr>
-              <a:t>9/30/2015</a:t>
+              <a:t>10/3/2015</a:t>
             </a:fld>
             <a:endParaRPr lang="en-US" dirty="0"/>
           </a:p>
@@ -3338,7 +3338,7 @@
             </a:pPr>
             <a:fld id="{342D3759-20A9-43AA-B66D-5F6D5C08724C}" type="datetime1">
               <a:rPr lang="pt-BR" smtClean="0"/>
-              <a:t>30/09/2015</a:t>
+              <a:t>03/10/2015</a:t>
             </a:fld>
             <a:endParaRPr lang="pt-BR" dirty="0"/>
           </a:p>
@@ -3536,7 +3536,7 @@
             </a:pPr>
             <a:fld id="{CFDC836C-7116-4783-B36C-83C3D2D5C787}" type="datetime1">
               <a:rPr lang="pt-BR" smtClean="0"/>
-              <a:t>30/09/2015</a:t>
+              <a:t>03/10/2015</a:t>
             </a:fld>
             <a:endParaRPr lang="pt-BR" dirty="0"/>
           </a:p>
@@ -3744,7 +3744,7 @@
             </a:pPr>
             <a:fld id="{0209899C-10C7-454F-A042-7A072DF1830C}" type="datetime1">
               <a:rPr lang="pt-BR" smtClean="0"/>
-              <a:t>30/09/2015</a:t>
+              <a:t>03/10/2015</a:t>
             </a:fld>
             <a:endParaRPr lang="pt-BR" dirty="0"/>
           </a:p>
@@ -3942,7 +3942,7 @@
             </a:pPr>
             <a:fld id="{17ABC896-FC96-4F76-ADDF-61B7CA6D5813}" type="datetime1">
               <a:rPr lang="pt-BR" smtClean="0"/>
-              <a:t>30/09/2015</a:t>
+              <a:t>03/10/2015</a:t>
             </a:fld>
             <a:endParaRPr lang="pt-BR" dirty="0"/>
           </a:p>
@@ -4216,7 +4216,7 @@
             </a:pPr>
             <a:fld id="{162C7ACC-65AB-493E-9DCA-8367F39CE5D5}" type="datetime1">
               <a:rPr lang="pt-BR" smtClean="0"/>
-              <a:t>30/09/2015</a:t>
+              <a:t>03/10/2015</a:t>
             </a:fld>
             <a:endParaRPr lang="pt-BR" dirty="0"/>
           </a:p>
@@ -4532,7 +4532,7 @@
             </a:pPr>
             <a:fld id="{DC180C78-9282-4796-A57D-D9596BF85D94}" type="datetime1">
               <a:rPr lang="pt-BR" smtClean="0"/>
-              <a:t>30/09/2015</a:t>
+              <a:t>03/10/2015</a:t>
             </a:fld>
             <a:endParaRPr lang="pt-BR" dirty="0"/>
           </a:p>
@@ -4982,7 +4982,7 @@
             </a:pPr>
             <a:fld id="{982449B7-97E0-424E-A93A-86BE054F847D}" type="datetime1">
               <a:rPr lang="pt-BR" smtClean="0"/>
-              <a:t>30/09/2015</a:t>
+              <a:t>03/10/2015</a:t>
             </a:fld>
             <a:endParaRPr lang="pt-BR" dirty="0"/>
           </a:p>
@@ -5128,7 +5128,7 @@
             </a:pPr>
             <a:fld id="{347292DE-2B66-4866-BA04-94AC197F48CA}" type="datetime1">
               <a:rPr lang="pt-BR" smtClean="0"/>
-              <a:t>30/09/2015</a:t>
+              <a:t>03/10/2015</a:t>
             </a:fld>
             <a:endParaRPr lang="pt-BR" dirty="0"/>
           </a:p>
@@ -5251,7 +5251,7 @@
             </a:pPr>
             <a:fld id="{04171D23-9202-4902-AC68-9103F0D0AE56}" type="datetime1">
               <a:rPr lang="pt-BR" smtClean="0"/>
-              <a:t>30/09/2015</a:t>
+              <a:t>03/10/2015</a:t>
             </a:fld>
             <a:endParaRPr lang="pt-BR" dirty="0"/>
           </a:p>
@@ -5556,7 +5556,7 @@
             </a:pPr>
             <a:fld id="{1B1A5FF7-3CFC-454B-960A-668E23AC65D5}" type="datetime1">
               <a:rPr lang="pt-BR" smtClean="0"/>
-              <a:t>30/09/2015</a:t>
+              <a:t>03/10/2015</a:t>
             </a:fld>
             <a:endParaRPr lang="pt-BR" dirty="0"/>
           </a:p>
@@ -5840,7 +5840,7 @@
             </a:pPr>
             <a:fld id="{6FB26D41-4245-4600-95DB-FC4247B5AF3E}" type="datetime1">
               <a:rPr lang="pt-BR" smtClean="0"/>
-              <a:t>30/09/2015</a:t>
+              <a:t>03/10/2015</a:t>
             </a:fld>
             <a:endParaRPr lang="pt-BR" dirty="0"/>
           </a:p>
@@ -6147,7 +6147,7 @@
             </a:pPr>
             <a:fld id="{42CDBA07-5F7C-4A3C-82DF-070F3ACC57C0}" type="datetime1">
               <a:rPr lang="pt-BR" smtClean="0"/>
-              <a:t>30/09/2015</a:t>
+              <a:t>03/10/2015</a:t>
             </a:fld>
             <a:endParaRPr lang="pt-BR" dirty="0"/>
           </a:p>
@@ -6887,20 +6887,6 @@
               </a:rPr>
               <a:t>Pinheiro </a:t>
             </a:r>
-            <a:endParaRPr lang="pt-BR" sz="2800" b="1" cap="all" dirty="0" smtClean="0">
-              <a:solidFill>
-                <a:schemeClr val="tx2"/>
-              </a:solidFill>
-              <a:effectLst>
-                <a:outerShdw blurRad="38100" dist="38100" dir="2700000" algn="tl">
-                  <a:srgbClr val="000000">
-                    <a:alpha val="43137"/>
-                  </a:srgbClr>
-                </a:outerShdw>
-              </a:effectLst>
-              <a:latin typeface="Arial" pitchFamily="34" charset="0"/>
-              <a:cs typeface="Arial" pitchFamily="34" charset="0"/>
-            </a:endParaRPr>
           </a:p>
           <a:p>
             <a:pPr algn="ctr">
@@ -7273,11 +7259,7 @@
             </a:r>
             <a:r>
               <a:rPr lang="pt-BR" noProof="1"/>
-              <a:t>de Solicitação </a:t>
-            </a:r>
-            <a:r>
-              <a:rPr lang="pt-BR" noProof="1"/>
-              <a:t>de </a:t>
+              <a:t>de Solicitação de </a:t>
             </a:r>
             <a:r>
               <a:rPr lang="pt-BR" noProof="1" smtClean="0"/>
@@ -7295,11 +7277,7 @@
             </a:r>
             <a:r>
               <a:rPr lang="pt-BR" noProof="1"/>
-              <a:t>descritivo </a:t>
-            </a:r>
-            <a:r>
-              <a:rPr lang="pt-BR" noProof="1"/>
-              <a:t>da </a:t>
+              <a:t>descritivo da </a:t>
             </a:r>
             <a:r>
               <a:rPr lang="pt-BR" noProof="1" smtClean="0"/>
@@ -7317,11 +7295,7 @@
             </a:r>
             <a:r>
               <a:rPr lang="pt-BR" noProof="1"/>
-              <a:t>de </a:t>
-            </a:r>
-            <a:r>
-              <a:rPr lang="pt-BR" noProof="1"/>
-              <a:t>Responsabilidade </a:t>
+              <a:t>de Responsabilidade </a:t>
             </a:r>
             <a:r>
               <a:rPr lang="pt-BR" noProof="1" smtClean="0"/>
@@ -9884,7 +9858,16 @@
                 </a:solidFill>
                 <a:cs typeface="Arial" charset="0"/>
               </a:rPr>
-              <a:t>Dimensionamento do sistema</a:t>
+              <a:t> Dimensionamento </a:t>
+            </a:r>
+            <a:r>
+              <a:rPr lang="pt-BR" b="1" dirty="0" smtClean="0">
+                <a:solidFill>
+                  <a:schemeClr val="tx2"/>
+                </a:solidFill>
+                <a:cs typeface="Arial" charset="0"/>
+              </a:rPr>
+              <a:t>do sistema</a:t>
             </a:r>
           </a:p>
           <a:p>
@@ -9935,23 +9918,8 @@
                 </a:solidFill>
                 <a:cs typeface="Arial" charset="0"/>
               </a:rPr>
-              <a:t> </a:t>
-            </a:r>
-            <a:r>
-              <a:rPr lang="pt-BR" b="1" dirty="0" smtClean="0">
-                <a:solidFill>
-                  <a:schemeClr val="tx2"/>
-                </a:solidFill>
-                <a:cs typeface="Arial" charset="0"/>
-              </a:rPr>
-              <a:t>Projeto</a:t>
-            </a:r>
-            <a:endParaRPr lang="pt-BR" b="1" dirty="0" smtClean="0">
-              <a:solidFill>
-                <a:schemeClr val="tx2"/>
-              </a:solidFill>
-              <a:cs typeface="Arial" charset="0"/>
-            </a:endParaRPr>
+              <a:t> Projeto</a:t>
+            </a:r>
           </a:p>
           <a:p>
             <a:pPr>
@@ -10272,7 +10240,15 @@
             <a:pPr marL="0" lvl="1" algn="just"/>
             <a:r>
               <a:rPr lang="pt-BR" noProof="1" smtClean="0"/>
-              <a:t>No momento de radiação mais elevada do dia o sol está fora de alimnhamento em relação a face dos painéis.</a:t>
+              <a:t>No momento de radiação mais elevada do dia o sol está fora de </a:t>
+            </a:r>
+            <a:r>
+              <a:rPr lang="pt-BR" noProof="1" smtClean="0"/>
+              <a:t>alinhamento </a:t>
+            </a:r>
+            <a:r>
+              <a:rPr lang="pt-BR" noProof="1" smtClean="0"/>
+              <a:t>em relação a face dos painéis.</a:t>
             </a:r>
           </a:p>
         </p:txBody>
@@ -10720,7 +10696,7 @@
         <p:spPr bwMode="auto">
           <a:xfrm>
             <a:off x="539750" y="1484785"/>
-            <a:ext cx="7871865" cy="1754326"/>
+            <a:ext cx="7871865" cy="2031325"/>
           </a:xfrm>
           <a:prstGeom prst="rect">
             <a:avLst/>
@@ -10758,7 +10734,15 @@
             <a:pPr marL="0" lvl="1" algn="just"/>
             <a:r>
               <a:rPr lang="pt-BR" noProof="1" smtClean="0"/>
-              <a:t>Como podemos observar, o resultado de geração não apresentou os valores esperados, porém, isto ocorreu devido a dificuldades físicas.</a:t>
+              <a:t>Como podemos observar, o resultado de geração não apresentou os valores esperados, porém, isto ocorreu devido a dificuldades </a:t>
+            </a:r>
+            <a:r>
+              <a:rPr lang="pt-BR" noProof="1" smtClean="0"/>
+              <a:t>na questão de instalações físicas</a:t>
+            </a:r>
+            <a:r>
+              <a:rPr lang="pt-BR" noProof="1" smtClean="0"/>
+              <a:t>.</a:t>
             </a:r>
           </a:p>
           <a:p>
@@ -11000,7 +10984,6 @@
               <a:rPr lang="pt-BR" noProof="1"/>
               <a:t> </a:t>
             </a:r>
-            <a:endParaRPr lang="pt-BR" noProof="1"/>
           </a:p>
         </p:txBody>
       </p:sp>
@@ -11766,7 +11749,15 @@
             <a:pPr marL="0" lvl="1" algn="just"/>
             <a:r>
               <a:rPr lang="pt-BR" noProof="1" smtClean="0"/>
-              <a:t>Em virtude disto e dos consequentes aumentos na tarifa de energia, diversas pessoas começaram a busca pela independência energética. Porém esta independência ainda necessita da rede elétrica da distribuidora em funcionamento, porque como não há armazenamento de energia neste sistema, é necessário gerar um excendente durante o dia, para consumir energia durante a noite.  </a:t>
+              <a:t>Em virtude disto e dos consequentes aumentos na tarifa de energia, diversas pessoas começaram a busca pela independência energética. Porém esta independência ainda necessita da rede elétrica da distribuidora em funcionamento, porque como não há armazenamento de energia neste sistema, é necessário gerar um </a:t>
+            </a:r>
+            <a:r>
+              <a:rPr lang="pt-BR" noProof="1" smtClean="0"/>
+              <a:t>excedente </a:t>
+            </a:r>
+            <a:r>
+              <a:rPr lang="pt-BR" noProof="1" smtClean="0"/>
+              <a:t>durante o dia, para consumir energia durante a noite.  </a:t>
             </a:r>
           </a:p>
         </p:txBody>
@@ -12000,11 +11991,7 @@
             <a:pPr marL="0" lvl="1" algn="just"/>
             <a:r>
               <a:rPr lang="pt-BR" noProof="1"/>
-              <a:t>UC</a:t>
-            </a:r>
-            <a:r>
-              <a:rPr lang="pt-BR" noProof="1"/>
-              <a:t>: </a:t>
+              <a:t>UC: </a:t>
             </a:r>
             <a:r>
               <a:rPr lang="pt-BR" noProof="1" smtClean="0"/>
@@ -12015,11 +12002,7 @@
             <a:pPr marL="0" lvl="1" algn="just"/>
             <a:r>
               <a:rPr lang="pt-BR" noProof="1"/>
-              <a:t>End</a:t>
-            </a:r>
-            <a:r>
-              <a:rPr lang="pt-BR" noProof="1"/>
-              <a:t>: </a:t>
+              <a:t>End: </a:t>
             </a:r>
             <a:r>
               <a:rPr lang="pt-BR" noProof="1" smtClean="0"/>
@@ -12027,11 +12010,7 @@
             </a:r>
             <a:r>
               <a:rPr lang="pt-BR" noProof="1"/>
-              <a:t>SRA APARECIDA</a:t>
-            </a:r>
-            <a:r>
-              <a:rPr lang="pt-BR" noProof="1"/>
-              <a:t>, </a:t>
+              <a:t>SRA APARECIDA, </a:t>
             </a:r>
             <a:r>
               <a:rPr lang="pt-BR" noProof="1" smtClean="0"/>
@@ -12039,11 +12018,7 @@
             </a:r>
             <a:r>
               <a:rPr lang="pt-BR" noProof="1"/>
-              <a:t>JARAGUA </a:t>
-            </a:r>
-            <a:r>
-              <a:rPr lang="pt-BR" noProof="1"/>
-              <a:t>DO </a:t>
+              <a:t>JARAGUA DO </a:t>
             </a:r>
             <a:r>
               <a:rPr lang="pt-BR" noProof="1" smtClean="0"/>
@@ -12091,7 +12066,6 @@
               <a:rPr lang="pt-BR" noProof="1" smtClean="0"/>
               <a:t>Obs: O consumo nesta residência inicou na metade do mês de Agosto, desta maneira a média a ser considerada levou em conta Setembro/2014 a Julho/2015. </a:t>
             </a:r>
-            <a:endParaRPr lang="pt-BR" noProof="1" smtClean="0"/>
           </a:p>
         </p:txBody>
       </p:sp>
@@ -12831,13 +12805,8 @@
             <a:pPr marL="0" lvl="1" algn="just"/>
             <a:r>
               <a:rPr lang="pt-BR" noProof="1"/>
-              <a:t>Posicionamento: Norte com inclinação de 22</a:t>
-            </a:r>
-            <a:r>
-              <a:rPr lang="pt-BR" noProof="1"/>
-              <a:t>°  </a:t>
-            </a:r>
-            <a:endParaRPr lang="pt-BR" noProof="1"/>
+              <a:t>Posicionamento: Norte com inclinação de 22°  </a:t>
+            </a:r>
           </a:p>
         </p:txBody>
       </p:sp>
@@ -13138,11 +13107,7 @@
             <a:pPr marL="0" lvl="1" algn="just"/>
             <a:r>
               <a:rPr lang="pt-BR" noProof="1"/>
-              <a:t>REQUISITOS PARA A CONEXÃO DE MICRO </a:t>
-            </a:r>
-            <a:r>
-              <a:rPr lang="pt-BR" noProof="1"/>
-              <a:t>OU </a:t>
+              <a:t>REQUISITOS PARA A CONEXÃO DE MICRO OU </a:t>
             </a:r>
             <a:r>
               <a:rPr lang="pt-BR" noProof="1" smtClean="0"/>
@@ -13150,11 +13115,7 @@
             </a:r>
             <a:r>
               <a:rPr lang="pt-BR" noProof="1"/>
-              <a:t>ENERGIA AO SISTEMA ELÉTRICO DA </a:t>
-            </a:r>
-            <a:r>
-              <a:rPr lang="pt-BR" noProof="1"/>
-              <a:t>CELESC </a:t>
+              <a:t>ENERGIA AO SISTEMA ELÉTRICO DA CELESC </a:t>
             </a:r>
             <a:r>
               <a:rPr lang="pt-BR" noProof="1" smtClean="0"/>
@@ -13164,13 +13125,7 @@
               <a:rPr lang="pt-BR" noProof="1">
                 <a:hlinkClick r:id="rId4"/>
               </a:rPr>
-              <a:t>http</a:t>
-            </a:r>
-            <a:r>
-              <a:rPr lang="pt-BR" noProof="1">
-                <a:hlinkClick r:id="rId4"/>
-              </a:rPr>
-              <a:t>://</a:t>
+              <a:t>http://</a:t>
             </a:r>
             <a:r>
               <a:rPr lang="pt-BR" noProof="1" smtClean="0">
@@ -13191,11 +13146,7 @@
             <a:pPr marL="0" lvl="1" algn="just"/>
             <a:r>
               <a:rPr lang="pt-BR" noProof="1"/>
-              <a:t>Perguntas Frequentes sobre a conexão de Sistemas de Microgeração </a:t>
-            </a:r>
-            <a:r>
-              <a:rPr lang="pt-BR" noProof="1"/>
-              <a:t>Fotovoltaicos </a:t>
+              <a:t>Perguntas Frequentes sobre a conexão de Sistemas de Microgeração Fotovoltaicos </a:t>
             </a:r>
             <a:r>
               <a:rPr lang="pt-BR" noProof="1" smtClean="0"/>
@@ -13203,27 +13154,13 @@
             </a:r>
             <a:r>
               <a:rPr lang="pt-BR" noProof="1"/>
-              <a:t>de Distribuição da Celesc em </a:t>
-            </a:r>
-            <a:r>
-              <a:rPr lang="pt-BR" noProof="1"/>
-              <a:t>Baixa </a:t>
-            </a:r>
-            <a:r>
-              <a:rPr lang="pt-BR" noProof="1"/>
-              <a:t>Tensão: </a:t>
+              <a:t>de Distribuição da Celesc em Baixa Tensão: </a:t>
             </a:r>
             <a:r>
               <a:rPr lang="pt-BR" noProof="1">
                 <a:hlinkClick r:id="rId5"/>
               </a:rPr>
-              <a:t>http</a:t>
-            </a:r>
-            <a:r>
-              <a:rPr lang="pt-BR" noProof="1">
-                <a:hlinkClick r:id="rId5"/>
-              </a:rPr>
-              <a:t>://</a:t>
+              <a:t>http://</a:t>
             </a:r>
             <a:r>
               <a:rPr lang="pt-BR" noProof="1" smtClean="0">

</xml_diff>